<commit_message>
refining world-model presentation in unit 3
</commit_message>
<xml_diff>
--- a/courses/bs2/units/unit3/world-model-source.pptx
+++ b/courses/bs2/units/unit3/world-model-source.pptx
@@ -6,6 +6,7 @@
   </p:sldMasterIdLst>
   <p:sldIdLst>
     <p:sldId id="256" r:id="rId2"/>
+    <p:sldId id="257" r:id="rId3"/>
   </p:sldIdLst>
   <p:sldSz cx="9144000" cy="6858000" type="screen4x3"/>
   <p:notesSz cx="6858000" cy="9144000"/>
@@ -3193,8 +3194,8 @@
         </p:nvSpPr>
         <p:spPr>
           <a:xfrm>
-            <a:off x="2157288" y="3447274"/>
-            <a:ext cx="800006" cy="338554"/>
+            <a:off x="1648768" y="3484869"/>
+            <a:ext cx="1800756" cy="553998"/>
           </a:xfrm>
           <a:prstGeom prst="rect">
             <a:avLst/>
@@ -3207,13 +3208,27 @@
           </a:bodyPr>
           <a:lstStyle/>
           <a:p>
+            <a:pPr algn="ctr"/>
             <a:r>
               <a:rPr lang="en-US" sz="1600" i="1" dirty="0" smtClean="0">
                 <a:solidFill>
                   <a:srgbClr val="660066"/>
                 </a:solidFill>
               </a:rPr>
-              <a:t>on-tick</a:t>
+              <a:t>on-tick:</a:t>
+            </a:r>
+          </a:p>
+          <a:p>
+            <a:pPr algn="ctr"/>
+            <a:r>
+              <a:rPr lang="en-US" sz="1400" dirty="0" smtClean="0">
+                <a:solidFill>
+                  <a:srgbClr val="000000"/>
+                </a:solidFill>
+                <a:latin typeface="Courier New"/>
+                <a:cs typeface="Courier New"/>
+              </a:rPr>
+              <a:t>next-state-tick</a:t>
             </a:r>
           </a:p>
         </p:txBody>
@@ -3226,8 +3241,8 @@
         </p:nvSpPr>
         <p:spPr>
           <a:xfrm>
-            <a:off x="1188955" y="2843347"/>
-            <a:ext cx="898290" cy="338554"/>
+            <a:off x="1188955" y="2700931"/>
+            <a:ext cx="1272328" cy="553998"/>
           </a:xfrm>
           <a:prstGeom prst="rect">
             <a:avLst/>
@@ -3246,12 +3261,20 @@
                   <a:srgbClr val="660066"/>
                 </a:solidFill>
               </a:rPr>
-              <a:t>to-draw</a:t>
-            </a:r>
-            <a:endParaRPr lang="en-US" sz="1600" i="1" dirty="0">
-              <a:solidFill>
-                <a:srgbClr val="660066"/>
-              </a:solidFill>
+              <a:t>to-draw:</a:t>
+            </a:r>
+          </a:p>
+          <a:p>
+            <a:r>
+              <a:rPr lang="en-US" sz="1400" dirty="0" smtClean="0">
+                <a:latin typeface="Courier New"/>
+                <a:cs typeface="Courier New"/>
+              </a:rPr>
+              <a:t>draw-state</a:t>
+            </a:r>
+            <a:endParaRPr lang="en-US" sz="1400" dirty="0">
+              <a:latin typeface="Courier New"/>
+              <a:cs typeface="Courier New"/>
             </a:endParaRPr>
           </a:p>
         </p:txBody>
@@ -3319,7 +3342,7 @@
                 <a:latin typeface="Courier New"/>
                 <a:cs typeface="Courier New"/>
               </a:rPr>
-              <a:t>sunset(18, 296)</a:t>
+              <a:t>sunset(26, 292)</a:t>
             </a:r>
             <a:endParaRPr lang="en-US" sz="1600" dirty="0">
               <a:latin typeface="Courier New"/>
@@ -3355,7 +3378,7 @@
                 <a:latin typeface="Courier New"/>
                 <a:cs typeface="Courier New"/>
               </a:rPr>
-              <a:t>sunset(26, 292)</a:t>
+              <a:t>sunset(42, 284)</a:t>
             </a:r>
             <a:endParaRPr lang="en-US" sz="1600" dirty="0">
               <a:latin typeface="Courier New"/>
@@ -3566,14 +3589,14 @@
       </p:cxnSp>
       <p:sp>
         <p:nvSpPr>
-          <p:cNvPr id="29" name="TextBox 28"/>
+          <p:cNvPr id="33" name="TextBox 32"/>
           <p:cNvSpPr txBox="1"/>
           <p:nvPr/>
         </p:nvSpPr>
         <p:spPr>
           <a:xfrm>
-            <a:off x="4964795" y="3433066"/>
-            <a:ext cx="800006" cy="338554"/>
+            <a:off x="192470" y="3141955"/>
+            <a:ext cx="556750" cy="338554"/>
           </a:xfrm>
           <a:prstGeom prst="rect">
             <a:avLst/>
@@ -3592,21 +3615,21 @@
                   <a:srgbClr val="660066"/>
                 </a:solidFill>
               </a:rPr>
-              <a:t>on-tick</a:t>
-            </a:r>
-          </a:p>
-        </p:txBody>
-      </p:sp>
-      <p:sp>
-        <p:nvSpPr>
-          <p:cNvPr id="30" name="TextBox 29"/>
+              <a:t>init:</a:t>
+            </a:r>
+          </a:p>
+        </p:txBody>
+      </p:sp>
+      <p:sp>
+        <p:nvSpPr>
+          <p:cNvPr id="34" name="TextBox 33"/>
           <p:cNvSpPr txBox="1"/>
           <p:nvPr/>
         </p:nvSpPr>
         <p:spPr>
           <a:xfrm>
-            <a:off x="3970433" y="2843347"/>
-            <a:ext cx="898290" cy="338554"/>
+            <a:off x="4002750" y="2691544"/>
+            <a:ext cx="1272328" cy="553998"/>
           </a:xfrm>
           <a:prstGeom prst="rect">
             <a:avLst/>
@@ -3625,26 +3648,34 @@
                   <a:srgbClr val="660066"/>
                 </a:solidFill>
               </a:rPr>
-              <a:t>to-draw</a:t>
-            </a:r>
-            <a:endParaRPr lang="en-US" sz="1600" i="1" dirty="0">
-              <a:solidFill>
-                <a:srgbClr val="660066"/>
-              </a:solidFill>
+              <a:t>to-draw:</a:t>
+            </a:r>
+          </a:p>
+          <a:p>
+            <a:r>
+              <a:rPr lang="en-US" sz="1400" dirty="0" smtClean="0">
+                <a:latin typeface="Courier New"/>
+                <a:cs typeface="Courier New"/>
+              </a:rPr>
+              <a:t>draw-state</a:t>
+            </a:r>
+            <a:endParaRPr lang="en-US" sz="1400" dirty="0">
+              <a:latin typeface="Courier New"/>
+              <a:cs typeface="Courier New"/>
             </a:endParaRPr>
           </a:p>
         </p:txBody>
       </p:sp>
       <p:sp>
         <p:nvSpPr>
-          <p:cNvPr id="31" name="TextBox 30"/>
+          <p:cNvPr id="35" name="TextBox 34"/>
           <p:cNvSpPr txBox="1"/>
           <p:nvPr/>
         </p:nvSpPr>
         <p:spPr>
           <a:xfrm>
-            <a:off x="6831528" y="2843347"/>
-            <a:ext cx="898290" cy="338554"/>
+            <a:off x="6833232" y="2702274"/>
+            <a:ext cx="1272328" cy="553998"/>
           </a:xfrm>
           <a:prstGeom prst="rect">
             <a:avLst/>
@@ -3663,26 +3694,34 @@
                   <a:srgbClr val="660066"/>
                 </a:solidFill>
               </a:rPr>
-              <a:t>to-draw</a:t>
-            </a:r>
-            <a:endParaRPr lang="en-US" sz="1600" i="1" dirty="0">
-              <a:solidFill>
-                <a:srgbClr val="660066"/>
-              </a:solidFill>
+              <a:t>to-draw:</a:t>
+            </a:r>
+          </a:p>
+          <a:p>
+            <a:r>
+              <a:rPr lang="en-US" sz="1400" dirty="0" smtClean="0">
+                <a:latin typeface="Courier New"/>
+                <a:cs typeface="Courier New"/>
+              </a:rPr>
+              <a:t>draw-state</a:t>
+            </a:r>
+            <a:endParaRPr lang="en-US" sz="1400" dirty="0">
+              <a:latin typeface="Courier New"/>
+              <a:cs typeface="Courier New"/>
             </a:endParaRPr>
           </a:p>
         </p:txBody>
       </p:sp>
       <p:sp>
         <p:nvSpPr>
-          <p:cNvPr id="33" name="TextBox 32"/>
+          <p:cNvPr id="36" name="TextBox 35"/>
           <p:cNvSpPr txBox="1"/>
           <p:nvPr/>
         </p:nvSpPr>
         <p:spPr>
           <a:xfrm>
-            <a:off x="192470" y="3141955"/>
-            <a:ext cx="501848" cy="338554"/>
+            <a:off x="4469264" y="3459249"/>
+            <a:ext cx="1800756" cy="553998"/>
           </a:xfrm>
           <a:prstGeom prst="rect">
             <a:avLst/>
@@ -3695,13 +3734,27 @@
           </a:bodyPr>
           <a:lstStyle/>
           <a:p>
+            <a:pPr algn="ctr"/>
             <a:r>
               <a:rPr lang="en-US" sz="1600" i="1" dirty="0" smtClean="0">
                 <a:solidFill>
                   <a:srgbClr val="660066"/>
                 </a:solidFill>
               </a:rPr>
-              <a:t>init</a:t>
+              <a:t>on-tick:</a:t>
+            </a:r>
+          </a:p>
+          <a:p>
+            <a:pPr algn="ctr"/>
+            <a:r>
+              <a:rPr lang="en-US" sz="1400" dirty="0" smtClean="0">
+                <a:solidFill>
+                  <a:srgbClr val="000000"/>
+                </a:solidFill>
+                <a:latin typeface="Courier New"/>
+                <a:cs typeface="Courier New"/>
+              </a:rPr>
+              <a:t>next-state-tick</a:t>
             </a:r>
           </a:p>
         </p:txBody>
@@ -3710,6 +3763,126 @@
     <p:extLst>
       <p:ext uri="{BB962C8B-B14F-4D97-AF65-F5344CB8AC3E}">
         <p14:creationId xmlns:p14="http://schemas.microsoft.com/office/powerpoint/2010/main" val="4119523557"/>
+      </p:ext>
+    </p:extLst>
+  </p:cSld>
+  <p:clrMapOvr>
+    <a:masterClrMapping/>
+  </p:clrMapOvr>
+</p:sld>
+</file>
+
+<file path=ppt/slides/slide2.xml><?xml version="1.0" encoding="utf-8"?>
+<p:sld xmlns:a="http://schemas.openxmlformats.org/drawingml/2006/main" xmlns:r="http://schemas.openxmlformats.org/officeDocument/2006/relationships" xmlns:p="http://schemas.openxmlformats.org/presentationml/2006/main">
+  <p:cSld>
+    <p:spTree>
+      <p:nvGrpSpPr>
+        <p:cNvPr id="1" name=""/>
+        <p:cNvGrpSpPr/>
+        <p:nvPr/>
+      </p:nvGrpSpPr>
+      <p:grpSpPr>
+        <a:xfrm>
+          <a:off x="0" y="0"/>
+          <a:ext cx="0" cy="0"/>
+          <a:chOff x="0" y="0"/>
+          <a:chExt cx="0" cy="0"/>
+        </a:xfrm>
+      </p:grpSpPr>
+      <p:pic>
+        <p:nvPicPr>
+          <p:cNvPr id="8" name="Picture 7" descr="Screenshot 2016-12-23 10.40.26.png"/>
+          <p:cNvPicPr>
+            <a:picLocks noChangeAspect="1"/>
+          </p:cNvPicPr>
+          <p:nvPr/>
+        </p:nvPicPr>
+        <p:blipFill>
+          <a:blip r:embed="rId2">
+            <a:extLst>
+              <a:ext uri="{28A0092B-C50C-407E-A947-70E740481C1C}">
+                <a14:useLocalDpi xmlns:a14="http://schemas.microsoft.com/office/drawing/2010/main" val="0"/>
+              </a:ext>
+            </a:extLst>
+          </a:blip>
+          <a:stretch>
+            <a:fillRect/>
+          </a:stretch>
+        </p:blipFill>
+        <p:spPr>
+          <a:xfrm>
+            <a:off x="2274418" y="1498599"/>
+            <a:ext cx="1586847" cy="1201919"/>
+          </a:xfrm>
+          <a:prstGeom prst="rect">
+            <a:avLst/>
+          </a:prstGeom>
+        </p:spPr>
+      </p:pic>
+      <p:pic>
+        <p:nvPicPr>
+          <p:cNvPr id="9" name="Picture 8" descr="Screenshot 2016-12-23 10.40.33.png"/>
+          <p:cNvPicPr>
+            <a:picLocks noChangeAspect="1"/>
+          </p:cNvPicPr>
+          <p:nvPr/>
+        </p:nvPicPr>
+        <p:blipFill>
+          <a:blip r:embed="rId3">
+            <a:extLst>
+              <a:ext uri="{28A0092B-C50C-407E-A947-70E740481C1C}">
+                <a14:useLocalDpi xmlns:a14="http://schemas.microsoft.com/office/drawing/2010/main" val="0"/>
+              </a:ext>
+            </a:extLst>
+          </a:blip>
+          <a:stretch>
+            <a:fillRect/>
+          </a:stretch>
+        </p:blipFill>
+        <p:spPr>
+          <a:xfrm>
+            <a:off x="4131032" y="1498599"/>
+            <a:ext cx="1605220" cy="1201919"/>
+          </a:xfrm>
+          <a:prstGeom prst="rect">
+            <a:avLst/>
+          </a:prstGeom>
+        </p:spPr>
+      </p:pic>
+      <p:pic>
+        <p:nvPicPr>
+          <p:cNvPr id="10" name="Picture 9" descr="Screenshot 2016-12-23 10.41.35.png"/>
+          <p:cNvPicPr>
+            <a:picLocks noChangeAspect="1"/>
+          </p:cNvPicPr>
+          <p:nvPr/>
+        </p:nvPicPr>
+        <p:blipFill>
+          <a:blip r:embed="rId4">
+            <a:extLst>
+              <a:ext uri="{28A0092B-C50C-407E-A947-70E740481C1C}">
+                <a14:useLocalDpi xmlns:a14="http://schemas.microsoft.com/office/drawing/2010/main" val="0"/>
+              </a:ext>
+            </a:extLst>
+          </a:blip>
+          <a:stretch>
+            <a:fillRect/>
+          </a:stretch>
+        </p:blipFill>
+        <p:spPr>
+          <a:xfrm>
+            <a:off x="391642" y="1498599"/>
+            <a:ext cx="1594625" cy="1201919"/>
+          </a:xfrm>
+          <a:prstGeom prst="rect">
+            <a:avLst/>
+          </a:prstGeom>
+        </p:spPr>
+      </p:pic>
+    </p:spTree>
+    <p:extLst>
+      <p:ext uri="{BB962C8B-B14F-4D97-AF65-F5344CB8AC3E}">
+        <p14:creationId xmlns:p14="http://schemas.microsoft.com/office/powerpoint/2010/main" val="3274466703"/>
       </p:ext>
     </p:extLst>
   </p:cSld>

</xml_diff>